<commit_message>
Adding Dynamic Task Paralellism example?
</commit_message>
<xml_diff>
--- a/Presentation/THasINKync - 4x3.pptx
+++ b/Presentation/THasINKync - 4x3.pptx
@@ -144,7 +144,7 @@
   </p:defaultTextStyle>
   <p:extLst>
     <p:ext uri="{EFAFB233-063F-42B5-8137-9DF3F51BA10A}">
-      <p15:sldGuideLst xmlns:p15="http://schemas.microsoft.com/office/powerpoint/2012/main" xmlns="">
+      <p15:sldGuideLst xmlns="" xmlns:p15="http://schemas.microsoft.com/office/powerpoint/2012/main">
         <p15:guide id="1" orient="horz" pos="1620" userDrawn="1">
           <p15:clr>
             <a:srgbClr val="A4A3A4"/>
@@ -3160,379 +3160,6 @@
       <dsp:cNvGrpSpPr/>
     </dsp:nvGrpSpPr>
     <dsp:grpSpPr/>
-    <dsp:sp modelId="{B88EDF4C-4C3E-43DA-8D4C-21268F4ED6EF}">
-      <dsp:nvSpPr>
-        <dsp:cNvPr id="0" name=""/>
-        <dsp:cNvSpPr/>
-      </dsp:nvSpPr>
-      <dsp:spPr>
-        <a:xfrm>
-          <a:off x="0" y="0"/>
-          <a:ext cx="1082239" cy="601244"/>
-        </a:xfrm>
-        <a:prstGeom prst="flowChartMultidocument">
-          <a:avLst/>
-        </a:prstGeom>
-        <a:solidFill>
-          <a:schemeClr val="accent1">
-            <a:hueOff val="0"/>
-            <a:satOff val="0"/>
-            <a:lumOff val="0"/>
-            <a:alphaOff val="0"/>
-          </a:schemeClr>
-        </a:solidFill>
-        <a:ln w="25400" cap="flat" cmpd="sng" algn="ctr">
-          <a:solidFill>
-            <a:schemeClr val="lt1">
-              <a:hueOff val="0"/>
-              <a:satOff val="0"/>
-              <a:lumOff val="0"/>
-              <a:alphaOff val="0"/>
-            </a:schemeClr>
-          </a:solidFill>
-          <a:prstDash val="solid"/>
-        </a:ln>
-        <a:effectLst/>
-      </dsp:spPr>
-      <dsp:style>
-        <a:lnRef idx="2">
-          <a:scrgbClr r="0" g="0" b="0"/>
-        </a:lnRef>
-        <a:fillRef idx="1">
-          <a:scrgbClr r="0" g="0" b="0"/>
-        </a:fillRef>
-        <a:effectRef idx="0">
-          <a:scrgbClr r="0" g="0" b="0"/>
-        </a:effectRef>
-        <a:fontRef idx="minor">
-          <a:schemeClr val="lt1"/>
-        </a:fontRef>
-      </dsp:style>
-      <dsp:txBody>
-        <a:bodyPr spcFirstLastPara="0" vert="horz" wrap="square" lIns="53340" tIns="53340" rIns="53340" bIns="53340" numCol="1" spcCol="1270" anchor="ctr" anchorCtr="0">
-          <a:noAutofit/>
-        </a:bodyPr>
-        <a:lstStyle/>
-        <a:p>
-          <a:pPr lvl="0" algn="ctr" defTabSz="622300">
-            <a:lnSpc>
-              <a:spcPct val="90000"/>
-            </a:lnSpc>
-            <a:spcBef>
-              <a:spcPct val="0"/>
-            </a:spcBef>
-            <a:spcAft>
-              <a:spcPct val="35000"/>
-            </a:spcAft>
-          </a:pPr>
-          <a:r>
-            <a:rPr lang="en-US" sz="1400" kern="1200" dirty="0" smtClean="0"/>
-            <a:t>…</a:t>
-          </a:r>
-          <a:endParaRPr lang="en-US" sz="1400" kern="1200" dirty="0"/>
-        </a:p>
-      </dsp:txBody>
-      <dsp:txXfrm>
-        <a:off x="0" y="102295"/>
-        <a:ext cx="931678" cy="476180"/>
-      </dsp:txXfrm>
-    </dsp:sp>
-    <dsp:sp modelId="{6F3F6FFB-3805-400E-92AC-42AFFB8E29D5}">
-      <dsp:nvSpPr>
-        <dsp:cNvPr id="0" name=""/>
-        <dsp:cNvSpPr/>
-      </dsp:nvSpPr>
-      <dsp:spPr>
-        <a:xfrm rot="5400000">
-          <a:off x="428386" y="616275"/>
-          <a:ext cx="225466" cy="270559"/>
-        </a:xfrm>
-        <a:prstGeom prst="rightArrow">
-          <a:avLst>
-            <a:gd name="adj1" fmla="val 60000"/>
-            <a:gd name="adj2" fmla="val 50000"/>
-          </a:avLst>
-        </a:prstGeom>
-        <a:solidFill>
-          <a:schemeClr val="accent1">
-            <a:tint val="60000"/>
-            <a:hueOff val="0"/>
-            <a:satOff val="0"/>
-            <a:lumOff val="0"/>
-            <a:alphaOff val="0"/>
-          </a:schemeClr>
-        </a:solidFill>
-        <a:ln>
-          <a:noFill/>
-        </a:ln>
-        <a:effectLst/>
-      </dsp:spPr>
-      <dsp:style>
-        <a:lnRef idx="0">
-          <a:scrgbClr r="0" g="0" b="0"/>
-        </a:lnRef>
-        <a:fillRef idx="1">
-          <a:scrgbClr r="0" g="0" b="0"/>
-        </a:fillRef>
-        <a:effectRef idx="0">
-          <a:scrgbClr r="0" g="0" b="0"/>
-        </a:effectRef>
-        <a:fontRef idx="minor">
-          <a:schemeClr val="lt1"/>
-        </a:fontRef>
-      </dsp:style>
-      <dsp:txBody>
-        <a:bodyPr spcFirstLastPara="0" vert="horz" wrap="square" lIns="0" tIns="0" rIns="0" bIns="0" numCol="1" spcCol="1270" anchor="ctr" anchorCtr="0">
-          <a:noAutofit/>
-        </a:bodyPr>
-        <a:lstStyle/>
-        <a:p>
-          <a:pPr lvl="0" algn="ctr" defTabSz="488950">
-            <a:lnSpc>
-              <a:spcPct val="90000"/>
-            </a:lnSpc>
-            <a:spcBef>
-              <a:spcPct val="0"/>
-            </a:spcBef>
-            <a:spcAft>
-              <a:spcPct val="35000"/>
-            </a:spcAft>
-          </a:pPr>
-          <a:endParaRPr lang="en-US" sz="1100" kern="1200"/>
-        </a:p>
-      </dsp:txBody>
-      <dsp:txXfrm rot="-5400000">
-        <a:off x="459952" y="638821"/>
-        <a:ext cx="162335" cy="157826"/>
-      </dsp:txXfrm>
-    </dsp:sp>
-    <dsp:sp modelId="{25EF5F4E-FB50-4FF9-B013-E9D8AA82EDC7}">
-      <dsp:nvSpPr>
-        <dsp:cNvPr id="0" name=""/>
-        <dsp:cNvSpPr/>
-      </dsp:nvSpPr>
-      <dsp:spPr>
-        <a:xfrm>
-          <a:off x="0" y="901866"/>
-          <a:ext cx="1082239" cy="601244"/>
-        </a:xfrm>
-        <a:prstGeom prst="roundRect">
-          <a:avLst>
-            <a:gd name="adj" fmla="val 10000"/>
-          </a:avLst>
-        </a:prstGeom>
-        <a:solidFill>
-          <a:schemeClr val="accent1">
-            <a:hueOff val="0"/>
-            <a:satOff val="0"/>
-            <a:lumOff val="0"/>
-            <a:alphaOff val="0"/>
-          </a:schemeClr>
-        </a:solidFill>
-        <a:ln w="25400" cap="flat" cmpd="sng" algn="ctr">
-          <a:solidFill>
-            <a:schemeClr val="lt1">
-              <a:hueOff val="0"/>
-              <a:satOff val="0"/>
-              <a:lumOff val="0"/>
-              <a:alphaOff val="0"/>
-            </a:schemeClr>
-          </a:solidFill>
-          <a:prstDash val="solid"/>
-        </a:ln>
-        <a:effectLst/>
-      </dsp:spPr>
-      <dsp:style>
-        <a:lnRef idx="2">
-          <a:scrgbClr r="0" g="0" b="0"/>
-        </a:lnRef>
-        <a:fillRef idx="1">
-          <a:scrgbClr r="0" g="0" b="0"/>
-        </a:fillRef>
-        <a:effectRef idx="0">
-          <a:scrgbClr r="0" g="0" b="0"/>
-        </a:effectRef>
-        <a:fontRef idx="minor">
-          <a:schemeClr val="lt1"/>
-        </a:fontRef>
-      </dsp:style>
-      <dsp:txBody>
-        <a:bodyPr spcFirstLastPara="0" vert="horz" wrap="square" lIns="53340" tIns="53340" rIns="53340" bIns="53340" numCol="1" spcCol="1270" anchor="ctr" anchorCtr="0">
-          <a:noAutofit/>
-        </a:bodyPr>
-        <a:lstStyle/>
-        <a:p>
-          <a:pPr lvl="0" algn="ctr" defTabSz="622300">
-            <a:lnSpc>
-              <a:spcPct val="90000"/>
-            </a:lnSpc>
-            <a:spcBef>
-              <a:spcPct val="0"/>
-            </a:spcBef>
-            <a:spcAft>
-              <a:spcPct val="35000"/>
-            </a:spcAft>
-          </a:pPr>
-          <a:r>
-            <a:rPr lang="en-US" sz="1400" kern="1200" dirty="0" smtClean="0"/>
-            <a:t>Accumulate Into Subtotal</a:t>
-          </a:r>
-          <a:endParaRPr lang="en-US" sz="1400" kern="1200" dirty="0"/>
-        </a:p>
-      </dsp:txBody>
-      <dsp:txXfrm>
-        <a:off x="17610" y="919476"/>
-        <a:ext cx="1047019" cy="566024"/>
-      </dsp:txXfrm>
-    </dsp:sp>
-    <dsp:sp modelId="{1BBC6809-A424-46A5-9C8A-0973516973CB}">
-      <dsp:nvSpPr>
-        <dsp:cNvPr id="0" name=""/>
-        <dsp:cNvSpPr/>
-      </dsp:nvSpPr>
-      <dsp:spPr>
-        <a:xfrm rot="5400000">
-          <a:off x="428386" y="1518141"/>
-          <a:ext cx="225466" cy="270559"/>
-        </a:xfrm>
-        <a:prstGeom prst="rightArrow">
-          <a:avLst>
-            <a:gd name="adj1" fmla="val 60000"/>
-            <a:gd name="adj2" fmla="val 50000"/>
-          </a:avLst>
-        </a:prstGeom>
-        <a:solidFill>
-          <a:schemeClr val="accent1">
-            <a:tint val="60000"/>
-            <a:hueOff val="0"/>
-            <a:satOff val="0"/>
-            <a:lumOff val="0"/>
-            <a:alphaOff val="0"/>
-          </a:schemeClr>
-        </a:solidFill>
-        <a:ln>
-          <a:noFill/>
-        </a:ln>
-        <a:effectLst/>
-      </dsp:spPr>
-      <dsp:style>
-        <a:lnRef idx="0">
-          <a:scrgbClr r="0" g="0" b="0"/>
-        </a:lnRef>
-        <a:fillRef idx="1">
-          <a:scrgbClr r="0" g="0" b="0"/>
-        </a:fillRef>
-        <a:effectRef idx="0">
-          <a:scrgbClr r="0" g="0" b="0"/>
-        </a:effectRef>
-        <a:fontRef idx="minor">
-          <a:schemeClr val="lt1"/>
-        </a:fontRef>
-      </dsp:style>
-      <dsp:txBody>
-        <a:bodyPr spcFirstLastPara="0" vert="horz" wrap="square" lIns="0" tIns="0" rIns="0" bIns="0" numCol="1" spcCol="1270" anchor="ctr" anchorCtr="0">
-          <a:noAutofit/>
-        </a:bodyPr>
-        <a:lstStyle/>
-        <a:p>
-          <a:pPr lvl="0" algn="ctr" defTabSz="488950">
-            <a:lnSpc>
-              <a:spcPct val="90000"/>
-            </a:lnSpc>
-            <a:spcBef>
-              <a:spcPct val="0"/>
-            </a:spcBef>
-            <a:spcAft>
-              <a:spcPct val="35000"/>
-            </a:spcAft>
-          </a:pPr>
-          <a:endParaRPr lang="en-US" sz="1100" kern="1200"/>
-        </a:p>
-      </dsp:txBody>
-      <dsp:txXfrm rot="-5400000">
-        <a:off x="459952" y="1540687"/>
-        <a:ext cx="162335" cy="157826"/>
-      </dsp:txXfrm>
-    </dsp:sp>
-    <dsp:sp modelId="{A72FF043-F390-4BC5-BCF5-E6F82BAB33C5}">
-      <dsp:nvSpPr>
-        <dsp:cNvPr id="0" name=""/>
-        <dsp:cNvSpPr/>
-      </dsp:nvSpPr>
-      <dsp:spPr>
-        <a:xfrm>
-          <a:off x="0" y="1803732"/>
-          <a:ext cx="1082239" cy="601244"/>
-        </a:xfrm>
-        <a:prstGeom prst="roundRect">
-          <a:avLst>
-            <a:gd name="adj" fmla="val 10000"/>
-          </a:avLst>
-        </a:prstGeom>
-        <a:solidFill>
-          <a:schemeClr val="accent1">
-            <a:hueOff val="0"/>
-            <a:satOff val="0"/>
-            <a:lumOff val="0"/>
-            <a:alphaOff val="0"/>
-          </a:schemeClr>
-        </a:solidFill>
-        <a:ln w="25400" cap="flat" cmpd="sng" algn="ctr">
-          <a:solidFill>
-            <a:schemeClr val="lt1">
-              <a:hueOff val="0"/>
-              <a:satOff val="0"/>
-              <a:lumOff val="0"/>
-              <a:alphaOff val="0"/>
-            </a:schemeClr>
-          </a:solidFill>
-          <a:prstDash val="solid"/>
-        </a:ln>
-        <a:effectLst/>
-      </dsp:spPr>
-      <dsp:style>
-        <a:lnRef idx="2">
-          <a:scrgbClr r="0" g="0" b="0"/>
-        </a:lnRef>
-        <a:fillRef idx="1">
-          <a:scrgbClr r="0" g="0" b="0"/>
-        </a:fillRef>
-        <a:effectRef idx="0">
-          <a:scrgbClr r="0" g="0" b="0"/>
-        </a:effectRef>
-        <a:fontRef idx="minor">
-          <a:schemeClr val="lt1"/>
-        </a:fontRef>
-      </dsp:style>
-      <dsp:txBody>
-        <a:bodyPr spcFirstLastPara="0" vert="horz" wrap="square" lIns="53340" tIns="53340" rIns="53340" bIns="53340" numCol="1" spcCol="1270" anchor="ctr" anchorCtr="0">
-          <a:noAutofit/>
-        </a:bodyPr>
-        <a:lstStyle/>
-        <a:p>
-          <a:pPr lvl="0" algn="ctr" defTabSz="622300">
-            <a:lnSpc>
-              <a:spcPct val="90000"/>
-            </a:lnSpc>
-            <a:spcBef>
-              <a:spcPct val="0"/>
-            </a:spcBef>
-            <a:spcAft>
-              <a:spcPct val="35000"/>
-            </a:spcAft>
-          </a:pPr>
-          <a:r>
-            <a:rPr lang="en-US" sz="1400" kern="1200" dirty="0" smtClean="0"/>
-            <a:t>Add Subtotal to Result</a:t>
-          </a:r>
-          <a:endParaRPr lang="en-US" sz="1400" kern="1200" dirty="0"/>
-        </a:p>
-      </dsp:txBody>
-      <dsp:txXfrm>
-        <a:off x="17610" y="1821342"/>
-        <a:ext cx="1047019" cy="566024"/>
-      </dsp:txXfrm>
-    </dsp:sp>
   </dsp:spTree>
 </dsp:drawing>
 </file>
@@ -3545,379 +3172,6 @@
       <dsp:cNvGrpSpPr/>
     </dsp:nvGrpSpPr>
     <dsp:grpSpPr/>
-    <dsp:sp modelId="{B88EDF4C-4C3E-43DA-8D4C-21268F4ED6EF}">
-      <dsp:nvSpPr>
-        <dsp:cNvPr id="0" name=""/>
-        <dsp:cNvSpPr/>
-      </dsp:nvSpPr>
-      <dsp:spPr>
-        <a:xfrm>
-          <a:off x="0" y="0"/>
-          <a:ext cx="1082239" cy="601244"/>
-        </a:xfrm>
-        <a:prstGeom prst="flowChartMultidocument">
-          <a:avLst/>
-        </a:prstGeom>
-        <a:solidFill>
-          <a:schemeClr val="accent1">
-            <a:hueOff val="0"/>
-            <a:satOff val="0"/>
-            <a:lumOff val="0"/>
-            <a:alphaOff val="0"/>
-          </a:schemeClr>
-        </a:solidFill>
-        <a:ln w="25400" cap="flat" cmpd="sng" algn="ctr">
-          <a:solidFill>
-            <a:schemeClr val="lt1">
-              <a:hueOff val="0"/>
-              <a:satOff val="0"/>
-              <a:lumOff val="0"/>
-              <a:alphaOff val="0"/>
-            </a:schemeClr>
-          </a:solidFill>
-          <a:prstDash val="solid"/>
-        </a:ln>
-        <a:effectLst/>
-      </dsp:spPr>
-      <dsp:style>
-        <a:lnRef idx="2">
-          <a:scrgbClr r="0" g="0" b="0"/>
-        </a:lnRef>
-        <a:fillRef idx="1">
-          <a:scrgbClr r="0" g="0" b="0"/>
-        </a:fillRef>
-        <a:effectRef idx="0">
-          <a:scrgbClr r="0" g="0" b="0"/>
-        </a:effectRef>
-        <a:fontRef idx="minor">
-          <a:schemeClr val="lt1"/>
-        </a:fontRef>
-      </dsp:style>
-      <dsp:txBody>
-        <a:bodyPr spcFirstLastPara="0" vert="horz" wrap="square" lIns="53340" tIns="53340" rIns="53340" bIns="53340" numCol="1" spcCol="1270" anchor="ctr" anchorCtr="0">
-          <a:noAutofit/>
-        </a:bodyPr>
-        <a:lstStyle/>
-        <a:p>
-          <a:pPr lvl="0" algn="ctr" defTabSz="622300">
-            <a:lnSpc>
-              <a:spcPct val="90000"/>
-            </a:lnSpc>
-            <a:spcBef>
-              <a:spcPct val="0"/>
-            </a:spcBef>
-            <a:spcAft>
-              <a:spcPct val="35000"/>
-            </a:spcAft>
-          </a:pPr>
-          <a:r>
-            <a:rPr lang="en-US" sz="1400" kern="1200" dirty="0" smtClean="0"/>
-            <a:t>…</a:t>
-          </a:r>
-          <a:endParaRPr lang="en-US" sz="1400" kern="1200" dirty="0"/>
-        </a:p>
-      </dsp:txBody>
-      <dsp:txXfrm>
-        <a:off x="0" y="102295"/>
-        <a:ext cx="931678" cy="476180"/>
-      </dsp:txXfrm>
-    </dsp:sp>
-    <dsp:sp modelId="{6F3F6FFB-3805-400E-92AC-42AFFB8E29D5}">
-      <dsp:nvSpPr>
-        <dsp:cNvPr id="0" name=""/>
-        <dsp:cNvSpPr/>
-      </dsp:nvSpPr>
-      <dsp:spPr>
-        <a:xfrm rot="5400000">
-          <a:off x="428386" y="616275"/>
-          <a:ext cx="225466" cy="270559"/>
-        </a:xfrm>
-        <a:prstGeom prst="rightArrow">
-          <a:avLst>
-            <a:gd name="adj1" fmla="val 60000"/>
-            <a:gd name="adj2" fmla="val 50000"/>
-          </a:avLst>
-        </a:prstGeom>
-        <a:solidFill>
-          <a:schemeClr val="accent1">
-            <a:tint val="60000"/>
-            <a:hueOff val="0"/>
-            <a:satOff val="0"/>
-            <a:lumOff val="0"/>
-            <a:alphaOff val="0"/>
-          </a:schemeClr>
-        </a:solidFill>
-        <a:ln>
-          <a:noFill/>
-        </a:ln>
-        <a:effectLst/>
-      </dsp:spPr>
-      <dsp:style>
-        <a:lnRef idx="0">
-          <a:scrgbClr r="0" g="0" b="0"/>
-        </a:lnRef>
-        <a:fillRef idx="1">
-          <a:scrgbClr r="0" g="0" b="0"/>
-        </a:fillRef>
-        <a:effectRef idx="0">
-          <a:scrgbClr r="0" g="0" b="0"/>
-        </a:effectRef>
-        <a:fontRef idx="minor">
-          <a:schemeClr val="lt1"/>
-        </a:fontRef>
-      </dsp:style>
-      <dsp:txBody>
-        <a:bodyPr spcFirstLastPara="0" vert="horz" wrap="square" lIns="0" tIns="0" rIns="0" bIns="0" numCol="1" spcCol="1270" anchor="ctr" anchorCtr="0">
-          <a:noAutofit/>
-        </a:bodyPr>
-        <a:lstStyle/>
-        <a:p>
-          <a:pPr lvl="0" algn="ctr" defTabSz="488950">
-            <a:lnSpc>
-              <a:spcPct val="90000"/>
-            </a:lnSpc>
-            <a:spcBef>
-              <a:spcPct val="0"/>
-            </a:spcBef>
-            <a:spcAft>
-              <a:spcPct val="35000"/>
-            </a:spcAft>
-          </a:pPr>
-          <a:endParaRPr lang="en-US" sz="1100" kern="1200"/>
-        </a:p>
-      </dsp:txBody>
-      <dsp:txXfrm rot="-5400000">
-        <a:off x="459952" y="638821"/>
-        <a:ext cx="162335" cy="157826"/>
-      </dsp:txXfrm>
-    </dsp:sp>
-    <dsp:sp modelId="{25EF5F4E-FB50-4FF9-B013-E9D8AA82EDC7}">
-      <dsp:nvSpPr>
-        <dsp:cNvPr id="0" name=""/>
-        <dsp:cNvSpPr/>
-      </dsp:nvSpPr>
-      <dsp:spPr>
-        <a:xfrm>
-          <a:off x="0" y="901866"/>
-          <a:ext cx="1082239" cy="601244"/>
-        </a:xfrm>
-        <a:prstGeom prst="roundRect">
-          <a:avLst>
-            <a:gd name="adj" fmla="val 10000"/>
-          </a:avLst>
-        </a:prstGeom>
-        <a:solidFill>
-          <a:schemeClr val="accent1">
-            <a:hueOff val="0"/>
-            <a:satOff val="0"/>
-            <a:lumOff val="0"/>
-            <a:alphaOff val="0"/>
-          </a:schemeClr>
-        </a:solidFill>
-        <a:ln w="25400" cap="flat" cmpd="sng" algn="ctr">
-          <a:solidFill>
-            <a:schemeClr val="lt1">
-              <a:hueOff val="0"/>
-              <a:satOff val="0"/>
-              <a:lumOff val="0"/>
-              <a:alphaOff val="0"/>
-            </a:schemeClr>
-          </a:solidFill>
-          <a:prstDash val="solid"/>
-        </a:ln>
-        <a:effectLst/>
-      </dsp:spPr>
-      <dsp:style>
-        <a:lnRef idx="2">
-          <a:scrgbClr r="0" g="0" b="0"/>
-        </a:lnRef>
-        <a:fillRef idx="1">
-          <a:scrgbClr r="0" g="0" b="0"/>
-        </a:fillRef>
-        <a:effectRef idx="0">
-          <a:scrgbClr r="0" g="0" b="0"/>
-        </a:effectRef>
-        <a:fontRef idx="minor">
-          <a:schemeClr val="lt1"/>
-        </a:fontRef>
-      </dsp:style>
-      <dsp:txBody>
-        <a:bodyPr spcFirstLastPara="0" vert="horz" wrap="square" lIns="53340" tIns="53340" rIns="53340" bIns="53340" numCol="1" spcCol="1270" anchor="ctr" anchorCtr="0">
-          <a:noAutofit/>
-        </a:bodyPr>
-        <a:lstStyle/>
-        <a:p>
-          <a:pPr lvl="0" algn="ctr" defTabSz="622300">
-            <a:lnSpc>
-              <a:spcPct val="90000"/>
-            </a:lnSpc>
-            <a:spcBef>
-              <a:spcPct val="0"/>
-            </a:spcBef>
-            <a:spcAft>
-              <a:spcPct val="35000"/>
-            </a:spcAft>
-          </a:pPr>
-          <a:r>
-            <a:rPr lang="en-US" sz="1400" kern="1200" dirty="0" smtClean="0"/>
-            <a:t>Accumulate Into Subtotal</a:t>
-          </a:r>
-          <a:endParaRPr lang="en-US" sz="1400" kern="1200" dirty="0"/>
-        </a:p>
-      </dsp:txBody>
-      <dsp:txXfrm>
-        <a:off x="17610" y="919476"/>
-        <a:ext cx="1047019" cy="566024"/>
-      </dsp:txXfrm>
-    </dsp:sp>
-    <dsp:sp modelId="{1BBC6809-A424-46A5-9C8A-0973516973CB}">
-      <dsp:nvSpPr>
-        <dsp:cNvPr id="0" name=""/>
-        <dsp:cNvSpPr/>
-      </dsp:nvSpPr>
-      <dsp:spPr>
-        <a:xfrm rot="5400000">
-          <a:off x="428386" y="1518141"/>
-          <a:ext cx="225466" cy="270559"/>
-        </a:xfrm>
-        <a:prstGeom prst="rightArrow">
-          <a:avLst>
-            <a:gd name="adj1" fmla="val 60000"/>
-            <a:gd name="adj2" fmla="val 50000"/>
-          </a:avLst>
-        </a:prstGeom>
-        <a:solidFill>
-          <a:schemeClr val="accent1">
-            <a:tint val="60000"/>
-            <a:hueOff val="0"/>
-            <a:satOff val="0"/>
-            <a:lumOff val="0"/>
-            <a:alphaOff val="0"/>
-          </a:schemeClr>
-        </a:solidFill>
-        <a:ln>
-          <a:noFill/>
-        </a:ln>
-        <a:effectLst/>
-      </dsp:spPr>
-      <dsp:style>
-        <a:lnRef idx="0">
-          <a:scrgbClr r="0" g="0" b="0"/>
-        </a:lnRef>
-        <a:fillRef idx="1">
-          <a:scrgbClr r="0" g="0" b="0"/>
-        </a:fillRef>
-        <a:effectRef idx="0">
-          <a:scrgbClr r="0" g="0" b="0"/>
-        </a:effectRef>
-        <a:fontRef idx="minor">
-          <a:schemeClr val="lt1"/>
-        </a:fontRef>
-      </dsp:style>
-      <dsp:txBody>
-        <a:bodyPr spcFirstLastPara="0" vert="horz" wrap="square" lIns="0" tIns="0" rIns="0" bIns="0" numCol="1" spcCol="1270" anchor="ctr" anchorCtr="0">
-          <a:noAutofit/>
-        </a:bodyPr>
-        <a:lstStyle/>
-        <a:p>
-          <a:pPr lvl="0" algn="ctr" defTabSz="488950">
-            <a:lnSpc>
-              <a:spcPct val="90000"/>
-            </a:lnSpc>
-            <a:spcBef>
-              <a:spcPct val="0"/>
-            </a:spcBef>
-            <a:spcAft>
-              <a:spcPct val="35000"/>
-            </a:spcAft>
-          </a:pPr>
-          <a:endParaRPr lang="en-US" sz="1100" kern="1200"/>
-        </a:p>
-      </dsp:txBody>
-      <dsp:txXfrm rot="-5400000">
-        <a:off x="459952" y="1540687"/>
-        <a:ext cx="162335" cy="157826"/>
-      </dsp:txXfrm>
-    </dsp:sp>
-    <dsp:sp modelId="{A72FF043-F390-4BC5-BCF5-E6F82BAB33C5}">
-      <dsp:nvSpPr>
-        <dsp:cNvPr id="0" name=""/>
-        <dsp:cNvSpPr/>
-      </dsp:nvSpPr>
-      <dsp:spPr>
-        <a:xfrm>
-          <a:off x="0" y="1803732"/>
-          <a:ext cx="1082239" cy="601244"/>
-        </a:xfrm>
-        <a:prstGeom prst="roundRect">
-          <a:avLst>
-            <a:gd name="adj" fmla="val 10000"/>
-          </a:avLst>
-        </a:prstGeom>
-        <a:solidFill>
-          <a:schemeClr val="accent1">
-            <a:hueOff val="0"/>
-            <a:satOff val="0"/>
-            <a:lumOff val="0"/>
-            <a:alphaOff val="0"/>
-          </a:schemeClr>
-        </a:solidFill>
-        <a:ln w="25400" cap="flat" cmpd="sng" algn="ctr">
-          <a:solidFill>
-            <a:schemeClr val="lt1">
-              <a:hueOff val="0"/>
-              <a:satOff val="0"/>
-              <a:lumOff val="0"/>
-              <a:alphaOff val="0"/>
-            </a:schemeClr>
-          </a:solidFill>
-          <a:prstDash val="solid"/>
-        </a:ln>
-        <a:effectLst/>
-      </dsp:spPr>
-      <dsp:style>
-        <a:lnRef idx="2">
-          <a:scrgbClr r="0" g="0" b="0"/>
-        </a:lnRef>
-        <a:fillRef idx="1">
-          <a:scrgbClr r="0" g="0" b="0"/>
-        </a:fillRef>
-        <a:effectRef idx="0">
-          <a:scrgbClr r="0" g="0" b="0"/>
-        </a:effectRef>
-        <a:fontRef idx="minor">
-          <a:schemeClr val="lt1"/>
-        </a:fontRef>
-      </dsp:style>
-      <dsp:txBody>
-        <a:bodyPr spcFirstLastPara="0" vert="horz" wrap="square" lIns="53340" tIns="53340" rIns="53340" bIns="53340" numCol="1" spcCol="1270" anchor="ctr" anchorCtr="0">
-          <a:noAutofit/>
-        </a:bodyPr>
-        <a:lstStyle/>
-        <a:p>
-          <a:pPr lvl="0" algn="ctr" defTabSz="622300">
-            <a:lnSpc>
-              <a:spcPct val="90000"/>
-            </a:lnSpc>
-            <a:spcBef>
-              <a:spcPct val="0"/>
-            </a:spcBef>
-            <a:spcAft>
-              <a:spcPct val="35000"/>
-            </a:spcAft>
-          </a:pPr>
-          <a:r>
-            <a:rPr lang="en-US" sz="1400" kern="1200" dirty="0" smtClean="0"/>
-            <a:t>Add Subtotal to Result</a:t>
-          </a:r>
-          <a:endParaRPr lang="en-US" sz="1400" kern="1200" dirty="0"/>
-        </a:p>
-      </dsp:txBody>
-      <dsp:txXfrm>
-        <a:off x="17610" y="1821342"/>
-        <a:ext cx="1047019" cy="566024"/>
-      </dsp:txXfrm>
-    </dsp:sp>
   </dsp:spTree>
 </dsp:drawing>
 </file>
@@ -3930,379 +3184,6 @@
       <dsp:cNvGrpSpPr/>
     </dsp:nvGrpSpPr>
     <dsp:grpSpPr/>
-    <dsp:sp modelId="{B88EDF4C-4C3E-43DA-8D4C-21268F4ED6EF}">
-      <dsp:nvSpPr>
-        <dsp:cNvPr id="0" name=""/>
-        <dsp:cNvSpPr/>
-      </dsp:nvSpPr>
-      <dsp:spPr>
-        <a:xfrm>
-          <a:off x="0" y="0"/>
-          <a:ext cx="1082239" cy="601244"/>
-        </a:xfrm>
-        <a:prstGeom prst="flowChartMultidocument">
-          <a:avLst/>
-        </a:prstGeom>
-        <a:solidFill>
-          <a:schemeClr val="accent1">
-            <a:hueOff val="0"/>
-            <a:satOff val="0"/>
-            <a:lumOff val="0"/>
-            <a:alphaOff val="0"/>
-          </a:schemeClr>
-        </a:solidFill>
-        <a:ln w="25400" cap="flat" cmpd="sng" algn="ctr">
-          <a:solidFill>
-            <a:schemeClr val="lt1">
-              <a:hueOff val="0"/>
-              <a:satOff val="0"/>
-              <a:lumOff val="0"/>
-              <a:alphaOff val="0"/>
-            </a:schemeClr>
-          </a:solidFill>
-          <a:prstDash val="solid"/>
-        </a:ln>
-        <a:effectLst/>
-      </dsp:spPr>
-      <dsp:style>
-        <a:lnRef idx="2">
-          <a:scrgbClr r="0" g="0" b="0"/>
-        </a:lnRef>
-        <a:fillRef idx="1">
-          <a:scrgbClr r="0" g="0" b="0"/>
-        </a:fillRef>
-        <a:effectRef idx="0">
-          <a:scrgbClr r="0" g="0" b="0"/>
-        </a:effectRef>
-        <a:fontRef idx="minor">
-          <a:schemeClr val="lt1"/>
-        </a:fontRef>
-      </dsp:style>
-      <dsp:txBody>
-        <a:bodyPr spcFirstLastPara="0" vert="horz" wrap="square" lIns="53340" tIns="53340" rIns="53340" bIns="53340" numCol="1" spcCol="1270" anchor="ctr" anchorCtr="0">
-          <a:noAutofit/>
-        </a:bodyPr>
-        <a:lstStyle/>
-        <a:p>
-          <a:pPr lvl="0" algn="ctr" defTabSz="622300">
-            <a:lnSpc>
-              <a:spcPct val="90000"/>
-            </a:lnSpc>
-            <a:spcBef>
-              <a:spcPct val="0"/>
-            </a:spcBef>
-            <a:spcAft>
-              <a:spcPct val="35000"/>
-            </a:spcAft>
-          </a:pPr>
-          <a:r>
-            <a:rPr lang="en-US" sz="1400" kern="1200" dirty="0" smtClean="0"/>
-            <a:t>…</a:t>
-          </a:r>
-          <a:endParaRPr lang="en-US" sz="1400" kern="1200" dirty="0"/>
-        </a:p>
-      </dsp:txBody>
-      <dsp:txXfrm>
-        <a:off x="0" y="102295"/>
-        <a:ext cx="931678" cy="476180"/>
-      </dsp:txXfrm>
-    </dsp:sp>
-    <dsp:sp modelId="{6F3F6FFB-3805-400E-92AC-42AFFB8E29D5}">
-      <dsp:nvSpPr>
-        <dsp:cNvPr id="0" name=""/>
-        <dsp:cNvSpPr/>
-      </dsp:nvSpPr>
-      <dsp:spPr>
-        <a:xfrm rot="5400000">
-          <a:off x="428386" y="616275"/>
-          <a:ext cx="225466" cy="270559"/>
-        </a:xfrm>
-        <a:prstGeom prst="rightArrow">
-          <a:avLst>
-            <a:gd name="adj1" fmla="val 60000"/>
-            <a:gd name="adj2" fmla="val 50000"/>
-          </a:avLst>
-        </a:prstGeom>
-        <a:solidFill>
-          <a:schemeClr val="accent1">
-            <a:tint val="60000"/>
-            <a:hueOff val="0"/>
-            <a:satOff val="0"/>
-            <a:lumOff val="0"/>
-            <a:alphaOff val="0"/>
-          </a:schemeClr>
-        </a:solidFill>
-        <a:ln>
-          <a:noFill/>
-        </a:ln>
-        <a:effectLst/>
-      </dsp:spPr>
-      <dsp:style>
-        <a:lnRef idx="0">
-          <a:scrgbClr r="0" g="0" b="0"/>
-        </a:lnRef>
-        <a:fillRef idx="1">
-          <a:scrgbClr r="0" g="0" b="0"/>
-        </a:fillRef>
-        <a:effectRef idx="0">
-          <a:scrgbClr r="0" g="0" b="0"/>
-        </a:effectRef>
-        <a:fontRef idx="minor">
-          <a:schemeClr val="lt1"/>
-        </a:fontRef>
-      </dsp:style>
-      <dsp:txBody>
-        <a:bodyPr spcFirstLastPara="0" vert="horz" wrap="square" lIns="0" tIns="0" rIns="0" bIns="0" numCol="1" spcCol="1270" anchor="ctr" anchorCtr="0">
-          <a:noAutofit/>
-        </a:bodyPr>
-        <a:lstStyle/>
-        <a:p>
-          <a:pPr lvl="0" algn="ctr" defTabSz="488950">
-            <a:lnSpc>
-              <a:spcPct val="90000"/>
-            </a:lnSpc>
-            <a:spcBef>
-              <a:spcPct val="0"/>
-            </a:spcBef>
-            <a:spcAft>
-              <a:spcPct val="35000"/>
-            </a:spcAft>
-          </a:pPr>
-          <a:endParaRPr lang="en-US" sz="1100" kern="1200"/>
-        </a:p>
-      </dsp:txBody>
-      <dsp:txXfrm rot="-5400000">
-        <a:off x="459952" y="638821"/>
-        <a:ext cx="162335" cy="157826"/>
-      </dsp:txXfrm>
-    </dsp:sp>
-    <dsp:sp modelId="{25EF5F4E-FB50-4FF9-B013-E9D8AA82EDC7}">
-      <dsp:nvSpPr>
-        <dsp:cNvPr id="0" name=""/>
-        <dsp:cNvSpPr/>
-      </dsp:nvSpPr>
-      <dsp:spPr>
-        <a:xfrm>
-          <a:off x="0" y="901866"/>
-          <a:ext cx="1082239" cy="601244"/>
-        </a:xfrm>
-        <a:prstGeom prst="roundRect">
-          <a:avLst>
-            <a:gd name="adj" fmla="val 10000"/>
-          </a:avLst>
-        </a:prstGeom>
-        <a:solidFill>
-          <a:schemeClr val="accent1">
-            <a:hueOff val="0"/>
-            <a:satOff val="0"/>
-            <a:lumOff val="0"/>
-            <a:alphaOff val="0"/>
-          </a:schemeClr>
-        </a:solidFill>
-        <a:ln w="25400" cap="flat" cmpd="sng" algn="ctr">
-          <a:solidFill>
-            <a:schemeClr val="lt1">
-              <a:hueOff val="0"/>
-              <a:satOff val="0"/>
-              <a:lumOff val="0"/>
-              <a:alphaOff val="0"/>
-            </a:schemeClr>
-          </a:solidFill>
-          <a:prstDash val="solid"/>
-        </a:ln>
-        <a:effectLst/>
-      </dsp:spPr>
-      <dsp:style>
-        <a:lnRef idx="2">
-          <a:scrgbClr r="0" g="0" b="0"/>
-        </a:lnRef>
-        <a:fillRef idx="1">
-          <a:scrgbClr r="0" g="0" b="0"/>
-        </a:fillRef>
-        <a:effectRef idx="0">
-          <a:scrgbClr r="0" g="0" b="0"/>
-        </a:effectRef>
-        <a:fontRef idx="minor">
-          <a:schemeClr val="lt1"/>
-        </a:fontRef>
-      </dsp:style>
-      <dsp:txBody>
-        <a:bodyPr spcFirstLastPara="0" vert="horz" wrap="square" lIns="53340" tIns="53340" rIns="53340" bIns="53340" numCol="1" spcCol="1270" anchor="ctr" anchorCtr="0">
-          <a:noAutofit/>
-        </a:bodyPr>
-        <a:lstStyle/>
-        <a:p>
-          <a:pPr lvl="0" algn="ctr" defTabSz="622300">
-            <a:lnSpc>
-              <a:spcPct val="90000"/>
-            </a:lnSpc>
-            <a:spcBef>
-              <a:spcPct val="0"/>
-            </a:spcBef>
-            <a:spcAft>
-              <a:spcPct val="35000"/>
-            </a:spcAft>
-          </a:pPr>
-          <a:r>
-            <a:rPr lang="en-US" sz="1400" kern="1200" dirty="0" smtClean="0"/>
-            <a:t>Accumulate Into Subtotal</a:t>
-          </a:r>
-          <a:endParaRPr lang="en-US" sz="1400" kern="1200" dirty="0"/>
-        </a:p>
-      </dsp:txBody>
-      <dsp:txXfrm>
-        <a:off x="17610" y="919476"/>
-        <a:ext cx="1047019" cy="566024"/>
-      </dsp:txXfrm>
-    </dsp:sp>
-    <dsp:sp modelId="{1BBC6809-A424-46A5-9C8A-0973516973CB}">
-      <dsp:nvSpPr>
-        <dsp:cNvPr id="0" name=""/>
-        <dsp:cNvSpPr/>
-      </dsp:nvSpPr>
-      <dsp:spPr>
-        <a:xfrm rot="5400000">
-          <a:off x="428386" y="1518141"/>
-          <a:ext cx="225466" cy="270559"/>
-        </a:xfrm>
-        <a:prstGeom prst="rightArrow">
-          <a:avLst>
-            <a:gd name="adj1" fmla="val 60000"/>
-            <a:gd name="adj2" fmla="val 50000"/>
-          </a:avLst>
-        </a:prstGeom>
-        <a:solidFill>
-          <a:schemeClr val="accent1">
-            <a:tint val="60000"/>
-            <a:hueOff val="0"/>
-            <a:satOff val="0"/>
-            <a:lumOff val="0"/>
-            <a:alphaOff val="0"/>
-          </a:schemeClr>
-        </a:solidFill>
-        <a:ln>
-          <a:noFill/>
-        </a:ln>
-        <a:effectLst/>
-      </dsp:spPr>
-      <dsp:style>
-        <a:lnRef idx="0">
-          <a:scrgbClr r="0" g="0" b="0"/>
-        </a:lnRef>
-        <a:fillRef idx="1">
-          <a:scrgbClr r="0" g="0" b="0"/>
-        </a:fillRef>
-        <a:effectRef idx="0">
-          <a:scrgbClr r="0" g="0" b="0"/>
-        </a:effectRef>
-        <a:fontRef idx="minor">
-          <a:schemeClr val="lt1"/>
-        </a:fontRef>
-      </dsp:style>
-      <dsp:txBody>
-        <a:bodyPr spcFirstLastPara="0" vert="horz" wrap="square" lIns="0" tIns="0" rIns="0" bIns="0" numCol="1" spcCol="1270" anchor="ctr" anchorCtr="0">
-          <a:noAutofit/>
-        </a:bodyPr>
-        <a:lstStyle/>
-        <a:p>
-          <a:pPr lvl="0" algn="ctr" defTabSz="488950">
-            <a:lnSpc>
-              <a:spcPct val="90000"/>
-            </a:lnSpc>
-            <a:spcBef>
-              <a:spcPct val="0"/>
-            </a:spcBef>
-            <a:spcAft>
-              <a:spcPct val="35000"/>
-            </a:spcAft>
-          </a:pPr>
-          <a:endParaRPr lang="en-US" sz="1100" kern="1200"/>
-        </a:p>
-      </dsp:txBody>
-      <dsp:txXfrm rot="-5400000">
-        <a:off x="459952" y="1540687"/>
-        <a:ext cx="162335" cy="157826"/>
-      </dsp:txXfrm>
-    </dsp:sp>
-    <dsp:sp modelId="{A72FF043-F390-4BC5-BCF5-E6F82BAB33C5}">
-      <dsp:nvSpPr>
-        <dsp:cNvPr id="0" name=""/>
-        <dsp:cNvSpPr/>
-      </dsp:nvSpPr>
-      <dsp:spPr>
-        <a:xfrm>
-          <a:off x="0" y="1803732"/>
-          <a:ext cx="1082239" cy="601244"/>
-        </a:xfrm>
-        <a:prstGeom prst="roundRect">
-          <a:avLst>
-            <a:gd name="adj" fmla="val 10000"/>
-          </a:avLst>
-        </a:prstGeom>
-        <a:solidFill>
-          <a:schemeClr val="accent1">
-            <a:hueOff val="0"/>
-            <a:satOff val="0"/>
-            <a:lumOff val="0"/>
-            <a:alphaOff val="0"/>
-          </a:schemeClr>
-        </a:solidFill>
-        <a:ln w="25400" cap="flat" cmpd="sng" algn="ctr">
-          <a:solidFill>
-            <a:schemeClr val="lt1">
-              <a:hueOff val="0"/>
-              <a:satOff val="0"/>
-              <a:lumOff val="0"/>
-              <a:alphaOff val="0"/>
-            </a:schemeClr>
-          </a:solidFill>
-          <a:prstDash val="solid"/>
-        </a:ln>
-        <a:effectLst/>
-      </dsp:spPr>
-      <dsp:style>
-        <a:lnRef idx="2">
-          <a:scrgbClr r="0" g="0" b="0"/>
-        </a:lnRef>
-        <a:fillRef idx="1">
-          <a:scrgbClr r="0" g="0" b="0"/>
-        </a:fillRef>
-        <a:effectRef idx="0">
-          <a:scrgbClr r="0" g="0" b="0"/>
-        </a:effectRef>
-        <a:fontRef idx="minor">
-          <a:schemeClr val="lt1"/>
-        </a:fontRef>
-      </dsp:style>
-      <dsp:txBody>
-        <a:bodyPr spcFirstLastPara="0" vert="horz" wrap="square" lIns="53340" tIns="53340" rIns="53340" bIns="53340" numCol="1" spcCol="1270" anchor="ctr" anchorCtr="0">
-          <a:noAutofit/>
-        </a:bodyPr>
-        <a:lstStyle/>
-        <a:p>
-          <a:pPr lvl="0" algn="ctr" defTabSz="622300">
-            <a:lnSpc>
-              <a:spcPct val="90000"/>
-            </a:lnSpc>
-            <a:spcBef>
-              <a:spcPct val="0"/>
-            </a:spcBef>
-            <a:spcAft>
-              <a:spcPct val="35000"/>
-            </a:spcAft>
-          </a:pPr>
-          <a:r>
-            <a:rPr lang="en-US" sz="1400" kern="1200" dirty="0" smtClean="0"/>
-            <a:t>Add Subtotal to Result</a:t>
-          </a:r>
-          <a:endParaRPr lang="en-US" sz="1400" kern="1200" dirty="0"/>
-        </a:p>
-      </dsp:txBody>
-      <dsp:txXfrm>
-        <a:off x="17610" y="1821342"/>
-        <a:ext cx="1047019" cy="566024"/>
-      </dsp:txXfrm>
-    </dsp:sp>
   </dsp:spTree>
 </dsp:drawing>
 </file>
@@ -7938,7 +6819,7 @@
           <a:p>
             <a:fld id="{F7BDCA69-2664-4DFF-ABC1-4FF1F3BA5447}" type="datetimeFigureOut">
               <a:rPr lang="en-US" smtClean="0"/>
-              <a:t>10/8/2015</a:t>
+              <a:t>10/13/2015</a:t>
             </a:fld>
             <a:endParaRPr lang="en-US"/>
           </a:p>
@@ -8484,7 +7365,7 @@
           <a:p>
             <a:fld id="{2A7CB402-B72D-3346-9EA5-354251120F9E}" type="datetimeFigureOut">
               <a:rPr lang="en-US" smtClean="0"/>
-              <a:t>10/8/2015</a:t>
+              <a:t>10/13/2015</a:t>
             </a:fld>
             <a:endParaRPr lang="en-US"/>
           </a:p>
@@ -8647,7 +7528,7 @@
           <a:p>
             <a:fld id="{2A7CB402-B72D-3346-9EA5-354251120F9E}" type="datetimeFigureOut">
               <a:rPr lang="en-US" smtClean="0"/>
-              <a:t>10/8/2015</a:t>
+              <a:t>10/13/2015</a:t>
             </a:fld>
             <a:endParaRPr lang="en-US"/>
           </a:p>
@@ -8808,7 +7689,7 @@
           <a:p>
             <a:fld id="{2A7CB402-B72D-3346-9EA5-354251120F9E}" type="datetimeFigureOut">
               <a:rPr lang="en-US" smtClean="0"/>
-              <a:t>10/8/2015</a:t>
+              <a:t>10/13/2015</a:t>
             </a:fld>
             <a:endParaRPr lang="en-US"/>
           </a:p>
@@ -9007,7 +7888,7 @@
           <a:p>
             <a:fld id="{2A7CB402-B72D-3346-9EA5-354251120F9E}" type="datetimeFigureOut">
               <a:rPr lang="en-US" smtClean="0"/>
-              <a:t>10/8/2015</a:t>
+              <a:t>10/13/2015</a:t>
             </a:fld>
             <a:endParaRPr lang="en-US"/>
           </a:p>
@@ -9238,7 +8119,7 @@
           <a:p>
             <a:fld id="{2A7CB402-B72D-3346-9EA5-354251120F9E}" type="datetimeFigureOut">
               <a:rPr lang="en-US" smtClean="0"/>
-              <a:t>10/8/2015</a:t>
+              <a:t>10/13/2015</a:t>
             </a:fld>
             <a:endParaRPr lang="en-US"/>
           </a:p>
@@ -9562,7 +8443,7 @@
           <a:p>
             <a:fld id="{2A7CB402-B72D-3346-9EA5-354251120F9E}" type="datetimeFigureOut">
               <a:rPr lang="en-US" smtClean="0"/>
-              <a:t>10/8/2015</a:t>
+              <a:t>10/13/2015</a:t>
             </a:fld>
             <a:endParaRPr lang="en-US"/>
           </a:p>
@@ -10024,7 +8905,7 @@
           <a:p>
             <a:fld id="{2A7CB402-B72D-3346-9EA5-354251120F9E}" type="datetimeFigureOut">
               <a:rPr lang="en-US" smtClean="0"/>
-              <a:t>10/8/2015</a:t>
+              <a:t>10/13/2015</a:t>
             </a:fld>
             <a:endParaRPr lang="en-US"/>
           </a:p>
@@ -10138,7 +9019,7 @@
           <a:p>
             <a:fld id="{2A7CB402-B72D-3346-9EA5-354251120F9E}" type="datetimeFigureOut">
               <a:rPr lang="en-US" smtClean="0"/>
-              <a:t>10/8/2015</a:t>
+              <a:t>10/13/2015</a:t>
             </a:fld>
             <a:endParaRPr lang="en-US"/>
           </a:p>
@@ -10214,7 +9095,7 @@
           <a:p>
             <a:fld id="{2A7CB402-B72D-3346-9EA5-354251120F9E}" type="datetimeFigureOut">
               <a:rPr lang="en-US" smtClean="0"/>
-              <a:t>10/8/2015</a:t>
+              <a:t>10/13/2015</a:t>
             </a:fld>
             <a:endParaRPr lang="en-US"/>
           </a:p>
@@ -10508,7 +9389,7 @@
           <a:p>
             <a:fld id="{2A7CB402-B72D-3346-9EA5-354251120F9E}" type="datetimeFigureOut">
               <a:rPr lang="en-US" smtClean="0"/>
-              <a:t>10/8/2015</a:t>
+              <a:t>10/13/2015</a:t>
             </a:fld>
             <a:endParaRPr lang="en-US"/>
           </a:p>
@@ -10746,7 +9627,7 @@
           <a:p>
             <a:fld id="{2A7CB402-B72D-3346-9EA5-354251120F9E}" type="datetimeFigureOut">
               <a:rPr lang="en-US" smtClean="0"/>
-              <a:t>10/8/2015</a:t>
+              <a:t>10/13/2015</a:t>
             </a:fld>
             <a:endParaRPr lang="en-US"/>
           </a:p>
@@ -10940,7 +9821,7 @@
           <a:p>
             <a:fld id="{2A7CB402-B72D-3346-9EA5-354251120F9E}" type="datetimeFigureOut">
               <a:rPr lang="en-US" smtClean="0"/>
-              <a:t>10/8/2015</a:t>
+              <a:t>10/13/2015</a:t>
             </a:fld>
             <a:endParaRPr lang="en-US"/>
           </a:p>
@@ -13815,8 +12696,19 @@
           <a:p>
             <a:r>
               <a:rPr lang="en-US" dirty="0" smtClean="0"/>
-              <a:t>Futures (Task Graph)</a:t>
-            </a:r>
+              <a:t>Futures (Task Graph</a:t>
+            </a:r>
+            <a:r>
+              <a:rPr lang="en-US" dirty="0" smtClean="0"/>
+              <a:t>)</a:t>
+            </a:r>
+          </a:p>
+          <a:p>
+            <a:r>
+              <a:rPr lang="en-US" dirty="0" smtClean="0"/>
+              <a:t>Dynamic Task Parallelism</a:t>
+            </a:r>
+            <a:endParaRPr lang="en-US" dirty="0" smtClean="0"/>
           </a:p>
           <a:p>
             <a:r>
@@ -19068,7 +17960,7 @@
   <a:extraClrSchemeLst/>
   <a:extLst>
     <a:ext uri="{05A4C25C-085E-4340-85A3-A5531E510DB2}">
-      <thm15:themeFamily xmlns:thm15="http://schemas.microsoft.com/office/thememl/2012/main" xmlns="" name="2013 Improving ppt template [Read-Only]" id="{9CD52372-1ABB-429C-AE8B-5116A847D281}" vid="{C9E045ED-5E7D-45F0-ABC2-8913C89F506A}"/>
+      <thm15:themeFamily xmlns="" xmlns:thm15="http://schemas.microsoft.com/office/thememl/2012/main" name="2013 Improving ppt template [Read-Only]" id="{9CD52372-1ABB-429C-AE8B-5116A847D281}" vid="{C9E045ED-5E7D-45F0-ABC2-8913C89F506A}"/>
     </a:ext>
   </a:extLst>
 </a:theme>
@@ -19360,21 +18252,6 @@
 </file>
 
 <file path=customXml/item1.xml><?xml version="1.0" encoding="utf-8"?>
-<?mso-contentType ?>
-<FormTemplates xmlns="http://schemas.microsoft.com/sharepoint/v3/contenttype/forms">
-  <Display>DocumentLibraryForm</Display>
-  <Edit>DocumentLibraryForm</Edit>
-  <New>DocumentLibraryForm</New>
-</FormTemplates>
-</file>
-
-<file path=customXml/item2.xml><?xml version="1.0" encoding="utf-8"?>
-<p:properties xmlns:p="http://schemas.microsoft.com/office/2006/metadata/properties" xmlns:xsi="http://www.w3.org/2001/XMLSchema-instance" xmlns:pc="http://schemas.microsoft.com/office/infopath/2007/PartnerControls">
-  <documentManagement/>
-</p:properties>
-</file>
-
-<file path=customXml/item3.xml><?xml version="1.0" encoding="utf-8"?>
 <ct:contentTypeSchema xmlns:ct="http://schemas.microsoft.com/office/2006/metadata/contentType" xmlns:ma="http://schemas.microsoft.com/office/2006/metadata/properties/metaAttributes" ct:_="" ma:_="" ma:contentTypeName="Document" ma:contentTypeID="0x010100D7398AE121397446B28901E5E849BF40" ma:contentTypeVersion="1" ma:contentTypeDescription="Create a new document." ma:contentTypeScope="" ma:versionID="a7e693a555462a2cb5a0a6921c4c327e">
   <xsd:schema xmlns:xsd="http://www.w3.org/2001/XMLSchema" xmlns:xs="http://www.w3.org/2001/XMLSchema" xmlns:p="http://schemas.microsoft.com/office/2006/metadata/properties" targetNamespace="http://schemas.microsoft.com/office/2006/metadata/properties" ma:root="true" ma:fieldsID="391dd5b7355e85894d95fdf891f88749">
     <xsd:element name="properties">
@@ -19488,10 +18365,33 @@
 </ct:contentTypeSchema>
 </file>
 
+<file path=customXml/item2.xml><?xml version="1.0" encoding="utf-8"?>
+<p:properties xmlns:p="http://schemas.microsoft.com/office/2006/metadata/properties" xmlns:xsi="http://www.w3.org/2001/XMLSchema-instance" xmlns:pc="http://schemas.microsoft.com/office/infopath/2007/PartnerControls">
+  <documentManagement/>
+</p:properties>
+</file>
+
+<file path=customXml/item3.xml><?xml version="1.0" encoding="utf-8"?>
+<?mso-contentType ?>
+<FormTemplates xmlns="http://schemas.microsoft.com/sharepoint/v3/contenttype/forms">
+  <Display>DocumentLibraryForm</Display>
+  <Edit>DocumentLibraryForm</Edit>
+  <New>DocumentLibraryForm</New>
+</FormTemplates>
+</file>
+
 <file path=customXml/itemProps1.xml><?xml version="1.0" encoding="utf-8"?>
-<ds:datastoreItem xmlns:ds="http://schemas.openxmlformats.org/officeDocument/2006/customXml" ds:itemID="{B857AB07-B2ED-439E-860F-4F56FB345D1B}">
+<ds:datastoreItem xmlns:ds="http://schemas.openxmlformats.org/officeDocument/2006/customXml" ds:itemID="{BC072F6F-04ED-4B85-B28F-4D6DE375C2E0}">
   <ds:schemaRefs>
-    <ds:schemaRef ds:uri="http://schemas.microsoft.com/sharepoint/v3/contenttype/forms"/>
+    <ds:schemaRef ds:uri="http://schemas.microsoft.com/office/2006/metadata/contentType"/>
+    <ds:schemaRef ds:uri="http://schemas.microsoft.com/office/2006/metadata/properties/metaAttributes"/>
+    <ds:schemaRef ds:uri="http://www.w3.org/2001/XMLSchema"/>
+    <ds:schemaRef ds:uri="http://schemas.microsoft.com/office/2006/metadata/properties"/>
+    <ds:schemaRef ds:uri="http://schemas.openxmlformats.org/package/2006/metadata/core-properties"/>
+    <ds:schemaRef ds:uri="http://purl.org/dc/elements/1.1/"/>
+    <ds:schemaRef ds:uri="http://purl.org/dc/terms/"/>
+    <ds:schemaRef ds:uri="http://schemas.microsoft.com/internal/obd"/>
+    <ds:schemaRef ds:uri="http://schemas.microsoft.com/office/infopath/2007/PartnerControls"/>
   </ds:schemaRefs>
 </ds:datastoreItem>
 </file>
@@ -19512,17 +18412,9 @@
 </file>
 
 <file path=customXml/itemProps3.xml><?xml version="1.0" encoding="utf-8"?>
-<ds:datastoreItem xmlns:ds="http://schemas.openxmlformats.org/officeDocument/2006/customXml" ds:itemID="{BC072F6F-04ED-4B85-B28F-4D6DE375C2E0}">
+<ds:datastoreItem xmlns:ds="http://schemas.openxmlformats.org/officeDocument/2006/customXml" ds:itemID="{B857AB07-B2ED-439E-860F-4F56FB345D1B}">
   <ds:schemaRefs>
-    <ds:schemaRef ds:uri="http://schemas.microsoft.com/office/2006/metadata/contentType"/>
-    <ds:schemaRef ds:uri="http://schemas.microsoft.com/office/2006/metadata/properties/metaAttributes"/>
-    <ds:schemaRef ds:uri="http://www.w3.org/2001/XMLSchema"/>
-    <ds:schemaRef ds:uri="http://schemas.microsoft.com/office/2006/metadata/properties"/>
-    <ds:schemaRef ds:uri="http://schemas.openxmlformats.org/package/2006/metadata/core-properties"/>
-    <ds:schemaRef ds:uri="http://purl.org/dc/elements/1.1/"/>
-    <ds:schemaRef ds:uri="http://purl.org/dc/terms/"/>
-    <ds:schemaRef ds:uri="http://schemas.microsoft.com/internal/obd"/>
-    <ds:schemaRef ds:uri="http://schemas.microsoft.com/office/infopath/2007/PartnerControls"/>
+    <ds:schemaRef ds:uri="http://schemas.microsoft.com/sharepoint/v3/contenttype/forms"/>
   </ds:schemaRefs>
 </ds:datastoreItem>
 </file>
</xml_diff>